<commit_message>
Setup the first routes and empty folders
</commit_message>
<xml_diff>
--- a/documentatie/Presentaties/Busplan Iteratie 1.pptx
+++ b/documentatie/Presentaties/Busplan Iteratie 1.pptx
@@ -5,13 +5,17 @@
     <p:sldMasterId id="2147483710" r:id="rId1"/>
   </p:sldMasterIdLst>
   <p:notesMasterIdLst>
-    <p:notesMasterId r:id="rId6"/>
+    <p:notesMasterId r:id="rId10"/>
   </p:notesMasterIdLst>
   <p:sldIdLst>
     <p:sldId id="256" r:id="rId2"/>
     <p:sldId id="257" r:id="rId3"/>
-    <p:sldId id="259" r:id="rId4"/>
-    <p:sldId id="258" r:id="rId5"/>
+    <p:sldId id="260" r:id="rId4"/>
+    <p:sldId id="263" r:id="rId5"/>
+    <p:sldId id="258" r:id="rId6"/>
+    <p:sldId id="261" r:id="rId7"/>
+    <p:sldId id="262" r:id="rId8"/>
+    <p:sldId id="264" r:id="rId9"/>
   </p:sldIdLst>
   <p:sldSz cx="12192000" cy="6858000"/>
   <p:notesSz cx="6858000" cy="9144000"/>
@@ -110,6 +114,11 @@
       </a:defRPr>
     </a:lvl9pPr>
   </p:defaultTextStyle>
+  <p:extLst>
+    <p:ext uri="{EFAFB233-063F-42B5-8137-9DF3F51BA10A}">
+      <p15:sldGuideLst xmlns:p15="http://schemas.microsoft.com/office/powerpoint/2012/main"/>
+    </p:ext>
+  </p:extLst>
 </p:presentation>
 </file>
 
@@ -195,7 +204,7 @@
           <a:p>
             <a:fld id="{90425F5C-F32B-4BB5-8EA3-39198CD675C2}" type="datetimeFigureOut">
               <a:rPr lang="nl-NL" smtClean="0"/>
-              <a:t>4-3-2021</a:t>
+              <a:t>11-3-2021</a:t>
             </a:fld>
             <a:endParaRPr lang="nl-NL"/>
           </a:p>
@@ -462,90 +471,6 @@
 </p:notesMaster>
 </file>
 
-<file path=ppt/notesSlides/notesSlide1.xml><?xml version="1.0" encoding="utf-8"?>
-<p:notes xmlns:a="http://schemas.openxmlformats.org/drawingml/2006/main" xmlns:r="http://schemas.openxmlformats.org/officeDocument/2006/relationships" xmlns:p="http://schemas.openxmlformats.org/presentationml/2006/main">
-  <p:cSld>
-    <p:spTree>
-      <p:nvGrpSpPr>
-        <p:cNvPr id="1" name=""/>
-        <p:cNvGrpSpPr/>
-        <p:nvPr/>
-      </p:nvGrpSpPr>
-      <p:grpSpPr>
-        <a:xfrm>
-          <a:off x="0" y="0"/>
-          <a:ext cx="0" cy="0"/>
-          <a:chOff x="0" y="0"/>
-          <a:chExt cx="0" cy="0"/>
-        </a:xfrm>
-      </p:grpSpPr>
-      <p:sp>
-        <p:nvSpPr>
-          <p:cNvPr id="2" name="Tijdelijke aanduiding voor dia-afbeelding 1"/>
-          <p:cNvSpPr>
-            <a:spLocks noGrp="1" noRot="1" noChangeAspect="1"/>
-          </p:cNvSpPr>
-          <p:nvPr>
-            <p:ph type="sldImg"/>
-          </p:nvPr>
-        </p:nvSpPr>
-        <p:spPr/>
-      </p:sp>
-      <p:sp>
-        <p:nvSpPr>
-          <p:cNvPr id="3" name="Tijdelijke aanduiding voor notities 2"/>
-          <p:cNvSpPr>
-            <a:spLocks noGrp="1"/>
-          </p:cNvSpPr>
-          <p:nvPr>
-            <p:ph type="body" idx="1"/>
-          </p:nvPr>
-        </p:nvSpPr>
-        <p:spPr/>
-        <p:txBody>
-          <a:bodyPr/>
-          <a:lstStyle/>
-          <a:p>
-            <a:endParaRPr lang="nl-NL" dirty="0"/>
-          </a:p>
-        </p:txBody>
-      </p:sp>
-      <p:sp>
-        <p:nvSpPr>
-          <p:cNvPr id="4" name="Tijdelijke aanduiding voor dianummer 3"/>
-          <p:cNvSpPr>
-            <a:spLocks noGrp="1"/>
-          </p:cNvSpPr>
-          <p:nvPr>
-            <p:ph type="sldNum" sz="quarter" idx="5"/>
-          </p:nvPr>
-        </p:nvSpPr>
-        <p:spPr/>
-        <p:txBody>
-          <a:bodyPr/>
-          <a:lstStyle/>
-          <a:p>
-            <a:fld id="{120D08CF-5B85-41E4-BB9A-96CAC9766B26}" type="slidenum">
-              <a:rPr lang="nl-NL" smtClean="0"/>
-              <a:t>3</a:t>
-            </a:fld>
-            <a:endParaRPr lang="nl-NL"/>
-          </a:p>
-        </p:txBody>
-      </p:sp>
-    </p:spTree>
-    <p:extLst>
-      <p:ext uri="{BB962C8B-B14F-4D97-AF65-F5344CB8AC3E}">
-        <p14:creationId xmlns:p14="http://schemas.microsoft.com/office/powerpoint/2010/main" val="941707913"/>
-      </p:ext>
-    </p:extLst>
-  </p:cSld>
-  <p:clrMapOvr>
-    <a:masterClrMapping/>
-  </p:clrMapOvr>
-</p:notes>
-</file>
-
 <file path=ppt/slideLayouts/slideLayout1.xml><?xml version="1.0" encoding="utf-8"?>
 <p:sldLayout xmlns:a="http://schemas.openxmlformats.org/drawingml/2006/main" xmlns:r="http://schemas.openxmlformats.org/officeDocument/2006/relationships" xmlns:p="http://schemas.openxmlformats.org/presentationml/2006/main" type="title" preserve="1">
   <p:cSld name="Title Slide">
@@ -700,7 +625,7 @@
           <a:p>
             <a:fld id="{11EAACC7-3B3F-47D1-959A-EF58926E955E}" type="datetimeFigureOut">
               <a:rPr lang="en-US" smtClean="0"/>
-              <a:t>3/4/2021</a:t>
+              <a:t>3/11/2021</a:t>
             </a:fld>
             <a:endParaRPr lang="en-US"/>
           </a:p>
@@ -898,7 +823,7 @@
           <a:p>
             <a:fld id="{11EAACC7-3B3F-47D1-959A-EF58926E955E}" type="datetimeFigureOut">
               <a:rPr lang="en-US" smtClean="0"/>
-              <a:t>3/4/2021</a:t>
+              <a:t>3/11/2021</a:t>
             </a:fld>
             <a:endParaRPr lang="en-US"/>
           </a:p>
@@ -1106,7 +1031,7 @@
           <a:p>
             <a:fld id="{11EAACC7-3B3F-47D1-959A-EF58926E955E}" type="datetimeFigureOut">
               <a:rPr lang="en-US" smtClean="0"/>
-              <a:t>3/4/2021</a:t>
+              <a:t>3/11/2021</a:t>
             </a:fld>
             <a:endParaRPr lang="en-US"/>
           </a:p>
@@ -1335,7 +1260,7 @@
           <a:p>
             <a:fld id="{11EAACC7-3B3F-47D1-959A-EF58926E955E}" type="datetimeFigureOut">
               <a:rPr lang="en-US" smtClean="0"/>
-              <a:t>3/4/2021</a:t>
+              <a:t>3/11/2021</a:t>
             </a:fld>
             <a:endParaRPr lang="en-US" dirty="0"/>
           </a:p>
@@ -1610,7 +1535,7 @@
           <a:p>
             <a:fld id="{11EAACC7-3B3F-47D1-959A-EF58926E955E}" type="datetimeFigureOut">
               <a:rPr lang="en-US" smtClean="0"/>
-              <a:t>3/4/2021</a:t>
+              <a:t>3/11/2021</a:t>
             </a:fld>
             <a:endParaRPr lang="en-US"/>
           </a:p>
@@ -1876,7 +1801,7 @@
           <a:p>
             <a:fld id="{11EAACC7-3B3F-47D1-959A-EF58926E955E}" type="datetimeFigureOut">
               <a:rPr lang="en-US" smtClean="0"/>
-              <a:t>3/4/2021</a:t>
+              <a:t>3/11/2021</a:t>
             </a:fld>
             <a:endParaRPr lang="en-US"/>
           </a:p>
@@ -2293,7 +2218,7 @@
           <a:p>
             <a:fld id="{11EAACC7-3B3F-47D1-959A-EF58926E955E}" type="datetimeFigureOut">
               <a:rPr lang="en-US" smtClean="0"/>
-              <a:t>3/4/2021</a:t>
+              <a:t>3/11/2021</a:t>
             </a:fld>
             <a:endParaRPr lang="en-US"/>
           </a:p>
@@ -2434,7 +2359,7 @@
           <a:p>
             <a:fld id="{11EAACC7-3B3F-47D1-959A-EF58926E955E}" type="datetimeFigureOut">
               <a:rPr lang="en-US" smtClean="0"/>
-              <a:t>3/4/2021</a:t>
+              <a:t>3/11/2021</a:t>
             </a:fld>
             <a:endParaRPr lang="en-US"/>
           </a:p>
@@ -2547,7 +2472,7 @@
           <a:p>
             <a:fld id="{11EAACC7-3B3F-47D1-959A-EF58926E955E}" type="datetimeFigureOut">
               <a:rPr lang="en-US" smtClean="0"/>
-              <a:t>3/4/2021</a:t>
+              <a:t>3/11/2021</a:t>
             </a:fld>
             <a:endParaRPr lang="en-US"/>
           </a:p>
@@ -2858,7 +2783,7 @@
           <a:p>
             <a:fld id="{11EAACC7-3B3F-47D1-959A-EF58926E955E}" type="datetimeFigureOut">
               <a:rPr lang="en-US" smtClean="0"/>
-              <a:t>3/4/2021</a:t>
+              <a:t>3/11/2021</a:t>
             </a:fld>
             <a:endParaRPr lang="en-US"/>
           </a:p>
@@ -3149,7 +3074,7 @@
           <a:p>
             <a:fld id="{11EAACC7-3B3F-47D1-959A-EF58926E955E}" type="datetimeFigureOut">
               <a:rPr lang="en-US" smtClean="0"/>
-              <a:t>3/4/2021</a:t>
+              <a:t>3/11/2021</a:t>
             </a:fld>
             <a:endParaRPr lang="en-US"/>
           </a:p>
@@ -3706,7 +3631,7 @@
           <a:p>
             <a:fld id="{11EAACC7-3B3F-47D1-959A-EF58926E955E}" type="datetimeFigureOut">
               <a:rPr lang="en-US" smtClean="0"/>
-              <a:t>3/4/2021</a:t>
+              <a:t>3/11/2021</a:t>
             </a:fld>
             <a:endParaRPr lang="en-US"/>
           </a:p>
@@ -4488,6 +4413,58 @@
           </a:fontRef>
         </p:style>
       </p:cxnSp>
+      <p:sp>
+        <p:nvSpPr>
+          <p:cNvPr id="4" name="Tekstvak 3">
+            <a:extLst>
+              <a:ext uri="{FF2B5EF4-FFF2-40B4-BE49-F238E27FC236}">
+                <a16:creationId xmlns:a16="http://schemas.microsoft.com/office/drawing/2014/main" id="{15908642-F6FA-4ABA-914B-3532A7C41F7F}"/>
+              </a:ext>
+            </a:extLst>
+          </p:cNvPr>
+          <p:cNvSpPr txBox="1"/>
+          <p:nvPr/>
+        </p:nvSpPr>
+        <p:spPr>
+          <a:xfrm>
+            <a:off x="8887745" y="6304002"/>
+            <a:ext cx="3222567" cy="369332"/>
+          </a:xfrm>
+          <a:prstGeom prst="rect">
+            <a:avLst/>
+          </a:prstGeom>
+          <a:noFill/>
+        </p:spPr>
+        <p:txBody>
+          <a:bodyPr wrap="square" rtlCol="0">
+            <a:spAutoFit/>
+          </a:bodyPr>
+          <a:lstStyle/>
+          <a:p>
+            <a:r>
+              <a:rPr lang="en-US" dirty="0"/>
+              <a:t>Jan, Jaron, </a:t>
+            </a:r>
+            <a:r>
+              <a:rPr lang="en-US" dirty="0" err="1"/>
+              <a:t>Givan</a:t>
+            </a:r>
+            <a:r>
+              <a:rPr lang="en-US" dirty="0"/>
+              <a:t>, Pieter </a:t>
+            </a:r>
+            <a:r>
+              <a:rPr lang="en-US" dirty="0" err="1"/>
+              <a:t>en</a:t>
+            </a:r>
+            <a:r>
+              <a:rPr lang="en-US" dirty="0"/>
+              <a:t> Noah</a:t>
+            </a:r>
+            <a:endParaRPr lang="nl-NL" dirty="0"/>
+          </a:p>
+        </p:txBody>
+      </p:sp>
     </p:spTree>
     <p:extLst>
       <p:ext uri="{BB962C8B-B14F-4D97-AF65-F5344CB8AC3E}">
@@ -4570,19 +4547,102 @@
           <a:p>
             <a:r>
               <a:rPr lang="en-US" dirty="0"/>
-              <a:t>Use case diagram</a:t>
-            </a:r>
-          </a:p>
-          <a:p>
+              <a:t>Wat </a:t>
+            </a:r>
+            <a:r>
+              <a:rPr lang="en-US" dirty="0" err="1"/>
+              <a:t>hebben</a:t>
+            </a:r>
             <a:r>
               <a:rPr lang="en-US" dirty="0"/>
-              <a:t>UI </a:t>
+              <a:t> we </a:t>
             </a:r>
             <a:r>
               <a:rPr lang="en-US" dirty="0" err="1"/>
-              <a:t>schetsen</a:t>
-            </a:r>
-            <a:endParaRPr lang="nl-NL" dirty="0"/>
+              <a:t>gedaan</a:t>
+            </a:r>
+            <a:r>
+              <a:rPr lang="en-US" dirty="0"/>
+              <a:t>?</a:t>
+            </a:r>
+          </a:p>
+          <a:p>
+            <a:r>
+              <a:rPr lang="en-US" dirty="0"/>
+              <a:t>Demo</a:t>
+            </a:r>
+          </a:p>
+          <a:p>
+            <a:r>
+              <a:rPr lang="en-US" dirty="0"/>
+              <a:t>Wat </a:t>
+            </a:r>
+            <a:r>
+              <a:rPr lang="en-US" dirty="0" err="1"/>
+              <a:t>gaan</a:t>
+            </a:r>
+            <a:r>
+              <a:rPr lang="en-US" dirty="0"/>
+              <a:t> we </a:t>
+            </a:r>
+            <a:r>
+              <a:rPr lang="en-US" dirty="0" err="1"/>
+              <a:t>komende</a:t>
+            </a:r>
+            <a:r>
+              <a:rPr lang="en-US" dirty="0"/>
+              <a:t> </a:t>
+            </a:r>
+            <a:r>
+              <a:rPr lang="en-US" dirty="0" err="1"/>
+              <a:t>iteratie</a:t>
+            </a:r>
+            <a:r>
+              <a:rPr lang="en-US" dirty="0"/>
+              <a:t> </a:t>
+            </a:r>
+            <a:r>
+              <a:rPr lang="en-US" dirty="0" err="1"/>
+              <a:t>doen</a:t>
+            </a:r>
+            <a:r>
+              <a:rPr lang="en-US" dirty="0"/>
+              <a:t>?</a:t>
+            </a:r>
+          </a:p>
+          <a:p>
+            <a:r>
+              <a:rPr lang="en-US" dirty="0" err="1"/>
+              <a:t>Tijd</a:t>
+            </a:r>
+            <a:r>
+              <a:rPr lang="en-US" dirty="0"/>
+              <a:t> </a:t>
+            </a:r>
+            <a:r>
+              <a:rPr lang="en-US" dirty="0" err="1"/>
+              <a:t>voor</a:t>
+            </a:r>
+            <a:r>
+              <a:rPr lang="en-US" dirty="0"/>
+              <a:t> </a:t>
+            </a:r>
+            <a:r>
+              <a:rPr lang="en-US" dirty="0" err="1"/>
+              <a:t>vragen</a:t>
+            </a:r>
+            <a:r>
+              <a:rPr lang="en-US" dirty="0"/>
+              <a:t>/</a:t>
+            </a:r>
+            <a:r>
+              <a:rPr lang="en-US" dirty="0" err="1"/>
+              <a:t>opmerkingen</a:t>
+            </a:r>
+            <a:r>
+              <a:rPr lang="en-US" dirty="0"/>
+              <a:t>?</a:t>
+            </a:r>
           </a:p>
         </p:txBody>
       </p:sp>
@@ -4621,7 +4681,7 @@
           <p:cNvPr id="2" name="Titel 1">
             <a:extLst>
               <a:ext uri="{FF2B5EF4-FFF2-40B4-BE49-F238E27FC236}">
-                <a16:creationId xmlns:a16="http://schemas.microsoft.com/office/drawing/2014/main" id="{600B99DA-FB23-4F00-A639-DF878A3A4BBE}"/>
+                <a16:creationId xmlns:a16="http://schemas.microsoft.com/office/drawing/2014/main" id="{ABA56B77-EDBA-424C-91AD-E94622BC788B}"/>
               </a:ext>
             </a:extLst>
           </p:cNvPr>
@@ -4639,51 +4699,108 @@
           <a:p>
             <a:r>
               <a:rPr lang="en-US" cap="none" dirty="0"/>
-              <a:t>Use case diagram</a:t>
+              <a:t>Wat </a:t>
+            </a:r>
+            <a:r>
+              <a:rPr lang="en-US" cap="none" dirty="0" err="1"/>
+              <a:t>hebben</a:t>
+            </a:r>
+            <a:r>
+              <a:rPr lang="en-US" cap="none" dirty="0"/>
+              <a:t> we </a:t>
+            </a:r>
+            <a:r>
+              <a:rPr lang="en-US" cap="none" dirty="0" err="1"/>
+              <a:t>gedaan</a:t>
+            </a:r>
+            <a:r>
+              <a:rPr lang="en-US" cap="none" dirty="0"/>
+              <a:t>?</a:t>
             </a:r>
             <a:endParaRPr lang="nl-NL" cap="none" dirty="0"/>
           </a:p>
         </p:txBody>
       </p:sp>
-      <p:pic>
-        <p:nvPicPr>
-          <p:cNvPr id="5" name="Tijdelijke aanduiding voor inhoud 4">
-            <a:extLst>
-              <a:ext uri="{FF2B5EF4-FFF2-40B4-BE49-F238E27FC236}">
-                <a16:creationId xmlns:a16="http://schemas.microsoft.com/office/drawing/2014/main" id="{DF13DFBD-7404-4807-B4FD-081D420167FF}"/>
-              </a:ext>
-            </a:extLst>
-          </p:cNvPr>
-          <p:cNvPicPr>
-            <a:picLocks noGrp="1" noChangeAspect="1"/>
-          </p:cNvPicPr>
+      <p:sp>
+        <p:nvSpPr>
+          <p:cNvPr id="3" name="Tijdelijke aanduiding voor inhoud 2">
+            <a:extLst>
+              <a:ext uri="{FF2B5EF4-FFF2-40B4-BE49-F238E27FC236}">
+                <a16:creationId xmlns:a16="http://schemas.microsoft.com/office/drawing/2014/main" id="{9E49C14B-FCA0-4E8C-998E-CA10075AADB9}"/>
+              </a:ext>
+            </a:extLst>
+          </p:cNvPr>
+          <p:cNvSpPr>
+            <a:spLocks noGrp="1"/>
+          </p:cNvSpPr>
           <p:nvPr>
             <p:ph idx="1"/>
           </p:nvPr>
-        </p:nvPicPr>
-        <p:blipFill>
-          <a:blip r:embed="rId3">
-            <a:extLst>
-              <a:ext uri="{28A0092B-C50C-407E-A947-70E740481C1C}">
-                <a14:useLocalDpi xmlns:a14="http://schemas.microsoft.com/office/drawing/2010/main" val="0"/>
-              </a:ext>
-            </a:extLst>
-          </a:blip>
-          <a:stretch>
-            <a:fillRect/>
-          </a:stretch>
-        </p:blipFill>
-        <p:spPr>
-          <a:xfrm>
-            <a:off x="1143000" y="1755251"/>
-            <a:ext cx="5614195" cy="4805018"/>
-          </a:xfrm>
-        </p:spPr>
-      </p:pic>
+        </p:nvSpPr>
+        <p:spPr/>
+        <p:txBody>
+          <a:bodyPr/>
+          <a:lstStyle/>
+          <a:p>
+            <a:r>
+              <a:rPr lang="en-US" dirty="0"/>
+              <a:t>Requirements / use-cases </a:t>
+            </a:r>
+            <a:r>
+              <a:rPr lang="en-US" dirty="0" err="1"/>
+              <a:t>opgesteld</a:t>
+            </a:r>
+            <a:r>
+              <a:rPr lang="en-US" dirty="0"/>
+              <a:t>.</a:t>
+            </a:r>
+          </a:p>
+          <a:p>
+            <a:r>
+              <a:rPr lang="en-US" dirty="0"/>
+              <a:t>Klassen diagram.</a:t>
+            </a:r>
+          </a:p>
+          <a:p>
+            <a:r>
+              <a:rPr lang="en-US" dirty="0"/>
+              <a:t>Database diagram</a:t>
+            </a:r>
+          </a:p>
+          <a:p>
+            <a:r>
+              <a:rPr lang="en-US" dirty="0"/>
+              <a:t>Framework </a:t>
+            </a:r>
+            <a:r>
+              <a:rPr lang="en-US" dirty="0" err="1"/>
+              <a:t>gekozen</a:t>
+            </a:r>
+            <a:r>
+              <a:rPr lang="en-US" dirty="0"/>
+              <a:t>.</a:t>
+            </a:r>
+          </a:p>
+          <a:p>
+            <a:r>
+              <a:rPr lang="en-US" dirty="0"/>
+              <a:t>UI </a:t>
+            </a:r>
+            <a:r>
+              <a:rPr lang="en-US" dirty="0" err="1"/>
+              <a:t>schetsen</a:t>
+            </a:r>
+            <a:r>
+              <a:rPr lang="en-US" dirty="0"/>
+              <a:t>.</a:t>
+            </a:r>
+          </a:p>
+        </p:txBody>
+      </p:sp>
     </p:spTree>
     <p:extLst>
       <p:ext uri="{BB962C8B-B14F-4D97-AF65-F5344CB8AC3E}">
-        <p14:creationId xmlns:p14="http://schemas.microsoft.com/office/powerpoint/2010/main" val="560601266"/>
+        <p14:creationId xmlns:p14="http://schemas.microsoft.com/office/powerpoint/2010/main" val="1156130289"/>
       </p:ext>
     </p:extLst>
   </p:cSld>
@@ -4710,12 +4827,48 @@
           <a:chExt cx="0" cy="0"/>
         </a:xfrm>
       </p:grpSpPr>
-      <p:sp>
-        <p:nvSpPr>
-          <p:cNvPr id="2" name="Titel 1">
-            <a:extLst>
-              <a:ext uri="{FF2B5EF4-FFF2-40B4-BE49-F238E27FC236}">
-                <a16:creationId xmlns:a16="http://schemas.microsoft.com/office/drawing/2014/main" id="{B9834A43-37D1-4222-B38B-22D1ACAEC865}"/>
+      <p:pic>
+        <p:nvPicPr>
+          <p:cNvPr id="4" name="Tijdelijke aanduiding voor inhoud 4">
+            <a:extLst>
+              <a:ext uri="{FF2B5EF4-FFF2-40B4-BE49-F238E27FC236}">
+                <a16:creationId xmlns:a16="http://schemas.microsoft.com/office/drawing/2014/main" id="{94A0D461-47EB-42D5-93F7-29BF5F1957C4}"/>
+              </a:ext>
+            </a:extLst>
+          </p:cNvPr>
+          <p:cNvPicPr>
+            <a:picLocks noChangeAspect="1"/>
+          </p:cNvPicPr>
+          <p:nvPr/>
+        </p:nvPicPr>
+        <p:blipFill>
+          <a:blip r:embed="rId2">
+            <a:extLst>
+              <a:ext uri="{28A0092B-C50C-407E-A947-70E740481C1C}">
+                <a14:useLocalDpi xmlns:a14="http://schemas.microsoft.com/office/drawing/2010/main" val="0"/>
+              </a:ext>
+            </a:extLst>
+          </a:blip>
+          <a:stretch>
+            <a:fillRect/>
+          </a:stretch>
+        </p:blipFill>
+        <p:spPr>
+          <a:xfrm>
+            <a:off x="1269943" y="1915557"/>
+            <a:ext cx="4826057" cy="4130475"/>
+          </a:xfrm>
+          <a:prstGeom prst="rect">
+            <a:avLst/>
+          </a:prstGeom>
+        </p:spPr>
+      </p:pic>
+      <p:sp>
+        <p:nvSpPr>
+          <p:cNvPr id="3" name="Titel 1">
+            <a:extLst>
+              <a:ext uri="{FF2B5EF4-FFF2-40B4-BE49-F238E27FC236}">
+                <a16:creationId xmlns:a16="http://schemas.microsoft.com/office/drawing/2014/main" id="{1F041A55-C12E-4C01-8A70-773CCD7079D3}"/>
               </a:ext>
             </a:extLst>
           </p:cNvPr>
@@ -4726,45 +4879,377 @@
             <p:ph type="title"/>
           </p:nvPr>
         </p:nvSpPr>
-        <p:spPr/>
+        <p:spPr>
+          <a:xfrm>
+            <a:off x="1143000" y="533401"/>
+            <a:ext cx="9906000" cy="1382156"/>
+          </a:xfrm>
+        </p:spPr>
         <p:txBody>
           <a:bodyPr/>
           <a:lstStyle/>
           <a:p>
             <a:r>
               <a:rPr lang="en-US" cap="none" dirty="0"/>
-              <a:t>UI </a:t>
+              <a:t>Demo </a:t>
             </a:r>
             <a:r>
               <a:rPr lang="en-US" cap="none" dirty="0" err="1"/>
-              <a:t>schetsen</a:t>
+              <a:t>producten</a:t>
             </a:r>
             <a:endParaRPr lang="nl-NL" cap="none" dirty="0"/>
           </a:p>
         </p:txBody>
       </p:sp>
-      <p:sp>
-        <p:nvSpPr>
-          <p:cNvPr id="3" name="Tijdelijke aanduiding voor inhoud 2">
-            <a:extLst>
-              <a:ext uri="{FF2B5EF4-FFF2-40B4-BE49-F238E27FC236}">
-                <a16:creationId xmlns:a16="http://schemas.microsoft.com/office/drawing/2014/main" id="{378C3B89-A084-485A-9150-984F29352E44}"/>
-              </a:ext>
-            </a:extLst>
-          </p:cNvPr>
-          <p:cNvSpPr>
-            <a:spLocks noGrp="1"/>
-          </p:cNvSpPr>
-          <p:nvPr>
-            <p:ph idx="1"/>
-          </p:nvPr>
-        </p:nvSpPr>
-        <p:spPr/>
+    </p:spTree>
+    <p:extLst>
+      <p:ext uri="{BB962C8B-B14F-4D97-AF65-F5344CB8AC3E}">
+        <p14:creationId xmlns:p14="http://schemas.microsoft.com/office/powerpoint/2010/main" val="1771133986"/>
+      </p:ext>
+    </p:extLst>
+  </p:cSld>
+  <p:clrMapOvr>
+    <a:masterClrMapping/>
+  </p:clrMapOvr>
+</p:sld>
+</file>
+
+<file path=ppt/slides/slide5.xml><?xml version="1.0" encoding="utf-8"?>
+<p:sld xmlns:a="http://schemas.openxmlformats.org/drawingml/2006/main" xmlns:r="http://schemas.openxmlformats.org/officeDocument/2006/relationships" xmlns:p="http://schemas.openxmlformats.org/presentationml/2006/main">
+  <p:cSld>
+    <p:bg>
+      <p:bgPr>
+        <a:solidFill>
+          <a:schemeClr val="bg1"/>
+        </a:solidFill>
+        <a:effectLst/>
+      </p:bgPr>
+    </p:bg>
+    <p:spTree>
+      <p:nvGrpSpPr>
+        <p:cNvPr id="1" name=""/>
+        <p:cNvGrpSpPr/>
+        <p:nvPr/>
+      </p:nvGrpSpPr>
+      <p:grpSpPr>
+        <a:xfrm>
+          <a:off x="0" y="0"/>
+          <a:ext cx="0" cy="0"/>
+          <a:chOff x="0" y="0"/>
+          <a:chExt cx="0" cy="0"/>
+        </a:xfrm>
+      </p:grpSpPr>
+      <p:pic>
+        <p:nvPicPr>
+          <p:cNvPr id="10" name="Afbeelding 9">
+            <a:extLst>
+              <a:ext uri="{FF2B5EF4-FFF2-40B4-BE49-F238E27FC236}">
+                <a16:creationId xmlns:a16="http://schemas.microsoft.com/office/drawing/2014/main" id="{CD084715-E02E-436F-8E57-239BEAA7C5F2}"/>
+              </a:ext>
+            </a:extLst>
+          </p:cNvPr>
+          <p:cNvPicPr>
+            <a:picLocks noChangeAspect="1"/>
+          </p:cNvPicPr>
+          <p:nvPr/>
+        </p:nvPicPr>
+        <p:blipFill>
+          <a:blip r:embed="rId2"/>
+          <a:stretch>
+            <a:fillRect/>
+          </a:stretch>
+        </p:blipFill>
+        <p:spPr>
+          <a:xfrm>
+            <a:off x="484632" y="2517013"/>
+            <a:ext cx="2560320" cy="1817827"/>
+          </a:xfrm>
+          <a:prstGeom prst="rect">
+            <a:avLst/>
+          </a:prstGeom>
+        </p:spPr>
+      </p:pic>
+      <p:cxnSp>
+        <p:nvCxnSpPr>
+          <p:cNvPr id="65" name="Straight Connector 48">
+            <a:extLst>
+              <a:ext uri="{FF2B5EF4-FFF2-40B4-BE49-F238E27FC236}">
+                <a16:creationId xmlns:a16="http://schemas.microsoft.com/office/drawing/2014/main" id="{50DA1EB8-87CF-4588-A1FD-4756F9A28F6B}"/>
+              </a:ext>
+              <a:ext uri="{C183D7F6-B498-43B3-948B-1728B52AA6E4}">
+                <adec:decorative xmlns:adec="http://schemas.microsoft.com/office/drawing/2017/decorative" val="1"/>
+              </a:ext>
+            </a:extLst>
+          </p:cNvPr>
+          <p:cNvCxnSpPr>
+            <a:cxnSpLocks noGrp="1" noRot="1" noChangeAspect="1" noMove="1" noResize="1" noEditPoints="1" noAdjustHandles="1" noChangeArrowheads="1" noChangeShapeType="1"/>
+          </p:cNvCxnSpPr>
+          <p:nvPr>
+            <p:extLst>
+              <p:ext uri="{386F3935-93C4-4BCD-93E2-E3B085C9AB24}">
+                <p16:designElem xmlns:p16="http://schemas.microsoft.com/office/powerpoint/2015/main" val="1"/>
+              </p:ext>
+            </p:extLst>
+          </p:nvPr>
+        </p:nvCxnSpPr>
+        <p:spPr>
+          <a:xfrm>
+            <a:off x="3210079" y="1573887"/>
+            <a:ext cx="0" cy="3710227"/>
+          </a:xfrm>
+          <a:prstGeom prst="line">
+            <a:avLst/>
+          </a:prstGeom>
+          <a:ln w="19050">
+            <a:solidFill>
+              <a:srgbClr val="7F7F7F"/>
+            </a:solidFill>
+          </a:ln>
+        </p:spPr>
+        <p:style>
+          <a:lnRef idx="1">
+            <a:schemeClr val="accent1"/>
+          </a:lnRef>
+          <a:fillRef idx="0">
+            <a:schemeClr val="accent1"/>
+          </a:fillRef>
+          <a:effectRef idx="0">
+            <a:schemeClr val="accent1"/>
+          </a:effectRef>
+          <a:fontRef idx="minor">
+            <a:schemeClr val="tx1"/>
+          </a:fontRef>
+        </p:style>
+      </p:cxnSp>
+      <p:pic>
+        <p:nvPicPr>
+          <p:cNvPr id="8" name="Afbeelding 7">
+            <a:extLst>
+              <a:ext uri="{FF2B5EF4-FFF2-40B4-BE49-F238E27FC236}">
+                <a16:creationId xmlns:a16="http://schemas.microsoft.com/office/drawing/2014/main" id="{6213D5B9-7B94-4CF1-B0F5-0FC5DEC986D3}"/>
+              </a:ext>
+            </a:extLst>
+          </p:cNvPr>
+          <p:cNvPicPr>
+            <a:picLocks noChangeAspect="1"/>
+          </p:cNvPicPr>
+          <p:nvPr/>
+        </p:nvPicPr>
+        <p:blipFill>
+          <a:blip r:embed="rId3"/>
+          <a:stretch>
+            <a:fillRect/>
+          </a:stretch>
+        </p:blipFill>
+        <p:spPr>
+          <a:xfrm>
+            <a:off x="3354631" y="2517013"/>
+            <a:ext cx="2560320" cy="1817827"/>
+          </a:xfrm>
+          <a:prstGeom prst="rect">
+            <a:avLst/>
+          </a:prstGeom>
+        </p:spPr>
+      </p:pic>
+      <p:cxnSp>
+        <p:nvCxnSpPr>
+          <p:cNvPr id="51" name="Straight Connector 50">
+            <a:extLst>
+              <a:ext uri="{FF2B5EF4-FFF2-40B4-BE49-F238E27FC236}">
+                <a16:creationId xmlns:a16="http://schemas.microsoft.com/office/drawing/2014/main" id="{D7A4E378-EA57-47B9-B1EB-58B998F6CFFB}"/>
+              </a:ext>
+              <a:ext uri="{C183D7F6-B498-43B3-948B-1728B52AA6E4}">
+                <adec:decorative xmlns:adec="http://schemas.microsoft.com/office/drawing/2017/decorative" val="1"/>
+              </a:ext>
+            </a:extLst>
+          </p:cNvPr>
+          <p:cNvCxnSpPr>
+            <a:cxnSpLocks noGrp="1" noRot="1" noChangeAspect="1" noMove="1" noResize="1" noEditPoints="1" noAdjustHandles="1" noChangeArrowheads="1" noChangeShapeType="1"/>
+          </p:cNvCxnSpPr>
+          <p:nvPr>
+            <p:extLst>
+              <p:ext uri="{386F3935-93C4-4BCD-93E2-E3B085C9AB24}">
+                <p16:designElem xmlns:p16="http://schemas.microsoft.com/office/powerpoint/2015/main" val="1"/>
+              </p:ext>
+            </p:extLst>
+          </p:nvPr>
+        </p:nvCxnSpPr>
+        <p:spPr>
+          <a:xfrm>
+            <a:off x="6072595" y="1573887"/>
+            <a:ext cx="0" cy="3710227"/>
+          </a:xfrm>
+          <a:prstGeom prst="line">
+            <a:avLst/>
+          </a:prstGeom>
+          <a:ln w="19050">
+            <a:solidFill>
+              <a:srgbClr val="7F7F7F"/>
+            </a:solidFill>
+          </a:ln>
+        </p:spPr>
+        <p:style>
+          <a:lnRef idx="1">
+            <a:schemeClr val="accent1"/>
+          </a:lnRef>
+          <a:fillRef idx="0">
+            <a:schemeClr val="accent1"/>
+          </a:fillRef>
+          <a:effectRef idx="0">
+            <a:schemeClr val="accent1"/>
+          </a:effectRef>
+          <a:fontRef idx="minor">
+            <a:schemeClr val="tx1"/>
+          </a:fontRef>
+        </p:style>
+      </p:cxnSp>
+      <p:pic>
+        <p:nvPicPr>
+          <p:cNvPr id="12" name="Afbeelding 11">
+            <a:extLst>
+              <a:ext uri="{FF2B5EF4-FFF2-40B4-BE49-F238E27FC236}">
+                <a16:creationId xmlns:a16="http://schemas.microsoft.com/office/drawing/2014/main" id="{CE447226-C9F6-4F84-95C4-426BB3CCB13C}"/>
+              </a:ext>
+            </a:extLst>
+          </p:cNvPr>
+          <p:cNvPicPr>
+            <a:picLocks noChangeAspect="1"/>
+          </p:cNvPicPr>
+          <p:nvPr/>
+        </p:nvPicPr>
+        <p:blipFill>
+          <a:blip r:embed="rId4"/>
+          <a:stretch>
+            <a:fillRect/>
+          </a:stretch>
+        </p:blipFill>
+        <p:spPr>
+          <a:xfrm>
+            <a:off x="6235726" y="2517013"/>
+            <a:ext cx="2560320" cy="1817827"/>
+          </a:xfrm>
+          <a:prstGeom prst="rect">
+            <a:avLst/>
+          </a:prstGeom>
+        </p:spPr>
+      </p:pic>
+      <p:cxnSp>
+        <p:nvCxnSpPr>
+          <p:cNvPr id="53" name="Straight Connector 52">
+            <a:extLst>
+              <a:ext uri="{FF2B5EF4-FFF2-40B4-BE49-F238E27FC236}">
+                <a16:creationId xmlns:a16="http://schemas.microsoft.com/office/drawing/2014/main" id="{D2B31ED6-76F0-425A-9A41-C947AEF9C145}"/>
+              </a:ext>
+              <a:ext uri="{C183D7F6-B498-43B3-948B-1728B52AA6E4}">
+                <adec:decorative xmlns:adec="http://schemas.microsoft.com/office/drawing/2017/decorative" val="1"/>
+              </a:ext>
+            </a:extLst>
+          </p:cNvPr>
+          <p:cNvCxnSpPr>
+            <a:cxnSpLocks noGrp="1" noRot="1" noChangeAspect="1" noMove="1" noResize="1" noEditPoints="1" noAdjustHandles="1" noChangeArrowheads="1" noChangeShapeType="1"/>
+          </p:cNvCxnSpPr>
+          <p:nvPr>
+            <p:extLst>
+              <p:ext uri="{386F3935-93C4-4BCD-93E2-E3B085C9AB24}">
+                <p16:designElem xmlns:p16="http://schemas.microsoft.com/office/powerpoint/2015/main" val="1"/>
+              </p:ext>
+            </p:extLst>
+          </p:nvPr>
+        </p:nvCxnSpPr>
+        <p:spPr>
+          <a:xfrm>
+            <a:off x="8956620" y="1573887"/>
+            <a:ext cx="0" cy="3710227"/>
+          </a:xfrm>
+          <a:prstGeom prst="line">
+            <a:avLst/>
+          </a:prstGeom>
+          <a:ln w="19050">
+            <a:solidFill>
+              <a:srgbClr val="7F7F7F"/>
+            </a:solidFill>
+          </a:ln>
+        </p:spPr>
+        <p:style>
+          <a:lnRef idx="1">
+            <a:schemeClr val="accent1"/>
+          </a:lnRef>
+          <a:fillRef idx="0">
+            <a:schemeClr val="accent1"/>
+          </a:fillRef>
+          <a:effectRef idx="0">
+            <a:schemeClr val="accent1"/>
+          </a:effectRef>
+          <a:fontRef idx="minor">
+            <a:schemeClr val="tx1"/>
+          </a:fontRef>
+        </p:style>
+      </p:cxnSp>
+      <p:pic>
+        <p:nvPicPr>
+          <p:cNvPr id="14" name="Afbeelding 13">
+            <a:extLst>
+              <a:ext uri="{FF2B5EF4-FFF2-40B4-BE49-F238E27FC236}">
+                <a16:creationId xmlns:a16="http://schemas.microsoft.com/office/drawing/2014/main" id="{EB48DDC1-2F8C-494B-A0EF-33C09C2F662D}"/>
+              </a:ext>
+            </a:extLst>
+          </p:cNvPr>
+          <p:cNvPicPr>
+            <a:picLocks noChangeAspect="1"/>
+          </p:cNvPicPr>
+          <p:nvPr/>
+        </p:nvPicPr>
+        <p:blipFill>
+          <a:blip r:embed="rId5"/>
+          <a:stretch>
+            <a:fillRect/>
+          </a:stretch>
+        </p:blipFill>
+        <p:spPr>
+          <a:xfrm>
+            <a:off x="9120662" y="2517013"/>
+            <a:ext cx="2560320" cy="1817827"/>
+          </a:xfrm>
+          <a:prstGeom prst="rect">
+            <a:avLst/>
+          </a:prstGeom>
+        </p:spPr>
+      </p:pic>
+      <p:sp>
+        <p:nvSpPr>
+          <p:cNvPr id="9" name="Titel 1">
+            <a:extLst>
+              <a:ext uri="{FF2B5EF4-FFF2-40B4-BE49-F238E27FC236}">
+                <a16:creationId xmlns:a16="http://schemas.microsoft.com/office/drawing/2014/main" id="{3FE8022E-2267-4F18-9CEA-9FA15B38E01D}"/>
+              </a:ext>
+            </a:extLst>
+          </p:cNvPr>
+          <p:cNvSpPr>
+            <a:spLocks noGrp="1"/>
+          </p:cNvSpPr>
+          <p:nvPr>
+            <p:ph type="title"/>
+          </p:nvPr>
+        </p:nvSpPr>
+        <p:spPr>
+          <a:xfrm>
+            <a:off x="1143000" y="533401"/>
+            <a:ext cx="9906000" cy="1382156"/>
+          </a:xfrm>
+        </p:spPr>
         <p:txBody>
           <a:bodyPr/>
           <a:lstStyle/>
           <a:p>
-            <a:endParaRPr lang="nl-NL" dirty="0"/>
+            <a:r>
+              <a:rPr lang="en-US" cap="none" dirty="0"/>
+              <a:t>Demo </a:t>
+            </a:r>
+            <a:r>
+              <a:rPr lang="en-US" cap="none" dirty="0" err="1"/>
+              <a:t>producten</a:t>
+            </a:r>
+            <a:endParaRPr lang="nl-NL" cap="none" dirty="0"/>
           </a:p>
         </p:txBody>
       </p:sp>
@@ -4772,6 +5257,472 @@
     <p:extLst>
       <p:ext uri="{BB962C8B-B14F-4D97-AF65-F5344CB8AC3E}">
         <p14:creationId xmlns:p14="http://schemas.microsoft.com/office/powerpoint/2010/main" val="4005371091"/>
+      </p:ext>
+    </p:extLst>
+  </p:cSld>
+  <p:clrMapOvr>
+    <a:masterClrMapping/>
+  </p:clrMapOvr>
+</p:sld>
+</file>
+
+<file path=ppt/slides/slide6.xml><?xml version="1.0" encoding="utf-8"?>
+<p:sld xmlns:a="http://schemas.openxmlformats.org/drawingml/2006/main" xmlns:r="http://schemas.openxmlformats.org/officeDocument/2006/relationships" xmlns:p="http://schemas.openxmlformats.org/presentationml/2006/main">
+  <p:cSld>
+    <p:bg>
+      <p:bgPr>
+        <a:solidFill>
+          <a:schemeClr val="bg1"/>
+        </a:solidFill>
+        <a:effectLst/>
+      </p:bgPr>
+    </p:bg>
+    <p:spTree>
+      <p:nvGrpSpPr>
+        <p:cNvPr id="1" name=""/>
+        <p:cNvGrpSpPr/>
+        <p:nvPr/>
+      </p:nvGrpSpPr>
+      <p:grpSpPr>
+        <a:xfrm>
+          <a:off x="0" y="0"/>
+          <a:ext cx="0" cy="0"/>
+          <a:chOff x="0" y="0"/>
+          <a:chExt cx="0" cy="0"/>
+        </a:xfrm>
+      </p:grpSpPr>
+      <p:pic>
+        <p:nvPicPr>
+          <p:cNvPr id="4" name="Afbeelding 3">
+            <a:extLst>
+              <a:ext uri="{FF2B5EF4-FFF2-40B4-BE49-F238E27FC236}">
+                <a16:creationId xmlns:a16="http://schemas.microsoft.com/office/drawing/2014/main" id="{2199B126-E800-4EF2-98D6-78C87109D83C}"/>
+              </a:ext>
+            </a:extLst>
+          </p:cNvPr>
+          <p:cNvPicPr>
+            <a:picLocks noChangeAspect="1"/>
+          </p:cNvPicPr>
+          <p:nvPr/>
+        </p:nvPicPr>
+        <p:blipFill>
+          <a:blip r:embed="rId2"/>
+          <a:stretch>
+            <a:fillRect/>
+          </a:stretch>
+        </p:blipFill>
+        <p:spPr>
+          <a:xfrm>
+            <a:off x="1308951" y="1123527"/>
+            <a:ext cx="2905854" cy="2063157"/>
+          </a:xfrm>
+          <a:prstGeom prst="rect">
+            <a:avLst/>
+          </a:prstGeom>
+        </p:spPr>
+      </p:pic>
+      <p:cxnSp>
+        <p:nvCxnSpPr>
+          <p:cNvPr id="21" name="Straight Connector 17">
+            <a:extLst>
+              <a:ext uri="{FF2B5EF4-FFF2-40B4-BE49-F238E27FC236}">
+                <a16:creationId xmlns:a16="http://schemas.microsoft.com/office/drawing/2014/main" id="{D4BDCD00-BA97-40D8-93CD-0A9CA931BE17}"/>
+              </a:ext>
+              <a:ext uri="{C183D7F6-B498-43B3-948B-1728B52AA6E4}">
+                <adec:decorative xmlns:adec="http://schemas.microsoft.com/office/drawing/2017/decorative" val="1"/>
+              </a:ext>
+            </a:extLst>
+          </p:cNvPr>
+          <p:cNvCxnSpPr>
+            <a:cxnSpLocks noGrp="1" noRot="1" noChangeAspect="1" noMove="1" noResize="1" noEditPoints="1" noAdjustHandles="1" noChangeArrowheads="1" noChangeShapeType="1"/>
+          </p:cNvCxnSpPr>
+          <p:nvPr>
+            <p:extLst>
+              <p:ext uri="{386F3935-93C4-4BCD-93E2-E3B085C9AB24}">
+                <p16:designElem xmlns:p16="http://schemas.microsoft.com/office/powerpoint/2015/main" val="1"/>
+              </p:ext>
+            </p:extLst>
+          </p:nvPr>
+        </p:nvCxnSpPr>
+        <p:spPr>
+          <a:xfrm>
+            <a:off x="1402080" y="3429000"/>
+            <a:ext cx="2636520" cy="0"/>
+          </a:xfrm>
+          <a:prstGeom prst="line">
+            <a:avLst/>
+          </a:prstGeom>
+          <a:ln w="19050">
+            <a:solidFill>
+              <a:srgbClr val="7F7F7F"/>
+            </a:solidFill>
+          </a:ln>
+        </p:spPr>
+        <p:style>
+          <a:lnRef idx="1">
+            <a:schemeClr val="accent1"/>
+          </a:lnRef>
+          <a:fillRef idx="0">
+            <a:schemeClr val="accent1"/>
+          </a:fillRef>
+          <a:effectRef idx="0">
+            <a:schemeClr val="accent1"/>
+          </a:effectRef>
+          <a:fontRef idx="minor">
+            <a:schemeClr val="tx1"/>
+          </a:fontRef>
+        </p:style>
+      </p:cxnSp>
+      <p:pic>
+        <p:nvPicPr>
+          <p:cNvPr id="6" name="Afbeelding 5">
+            <a:extLst>
+              <a:ext uri="{FF2B5EF4-FFF2-40B4-BE49-F238E27FC236}">
+                <a16:creationId xmlns:a16="http://schemas.microsoft.com/office/drawing/2014/main" id="{87DEC887-58B9-4957-A8C0-812A4E83C84F}"/>
+              </a:ext>
+            </a:extLst>
+          </p:cNvPr>
+          <p:cNvPicPr>
+            <a:picLocks noChangeAspect="1"/>
+          </p:cNvPicPr>
+          <p:nvPr/>
+        </p:nvPicPr>
+        <p:blipFill>
+          <a:blip r:embed="rId3"/>
+          <a:stretch>
+            <a:fillRect/>
+          </a:stretch>
+        </p:blipFill>
+        <p:spPr>
+          <a:xfrm>
+            <a:off x="1320028" y="3671316"/>
+            <a:ext cx="2897198" cy="2057011"/>
+          </a:xfrm>
+          <a:prstGeom prst="rect">
+            <a:avLst/>
+          </a:prstGeom>
+        </p:spPr>
+      </p:pic>
+      <p:cxnSp>
+        <p:nvCxnSpPr>
+          <p:cNvPr id="20" name="Straight Connector 19">
+            <a:extLst>
+              <a:ext uri="{FF2B5EF4-FFF2-40B4-BE49-F238E27FC236}">
+                <a16:creationId xmlns:a16="http://schemas.microsoft.com/office/drawing/2014/main" id="{2D631E40-F51C-4828-B23B-DF903513296E}"/>
+              </a:ext>
+              <a:ext uri="{C183D7F6-B498-43B3-948B-1728B52AA6E4}">
+                <adec:decorative xmlns:adec="http://schemas.microsoft.com/office/drawing/2017/decorative" val="1"/>
+              </a:ext>
+            </a:extLst>
+          </p:cNvPr>
+          <p:cNvCxnSpPr>
+            <a:cxnSpLocks noGrp="1" noRot="1" noChangeAspect="1" noMove="1" noResize="1" noEditPoints="1" noAdjustHandles="1" noChangeArrowheads="1" noChangeShapeType="1"/>
+          </p:cNvCxnSpPr>
+          <p:nvPr>
+            <p:extLst>
+              <p:ext uri="{386F3935-93C4-4BCD-93E2-E3B085C9AB24}">
+                <p16:designElem xmlns:p16="http://schemas.microsoft.com/office/powerpoint/2015/main" val="1"/>
+              </p:ext>
+            </p:extLst>
+          </p:nvPr>
+        </p:nvCxnSpPr>
+        <p:spPr>
+          <a:xfrm>
+            <a:off x="4654296" y="1573887"/>
+            <a:ext cx="0" cy="3710227"/>
+          </a:xfrm>
+          <a:prstGeom prst="line">
+            <a:avLst/>
+          </a:prstGeom>
+          <a:ln w="19050">
+            <a:solidFill>
+              <a:srgbClr val="7F7F7F"/>
+            </a:solidFill>
+          </a:ln>
+        </p:spPr>
+        <p:style>
+          <a:lnRef idx="1">
+            <a:schemeClr val="accent1"/>
+          </a:lnRef>
+          <a:fillRef idx="0">
+            <a:schemeClr val="accent1"/>
+          </a:fillRef>
+          <a:effectRef idx="0">
+            <a:schemeClr val="accent1"/>
+          </a:effectRef>
+          <a:fontRef idx="minor">
+            <a:schemeClr val="tx1"/>
+          </a:fontRef>
+        </p:style>
+      </p:cxnSp>
+      <p:pic>
+        <p:nvPicPr>
+          <p:cNvPr id="5" name="Afbeelding 4" descr="Afbeelding met tekst&#10;&#10;Automatisch gegenereerde beschrijving">
+            <a:extLst>
+              <a:ext uri="{FF2B5EF4-FFF2-40B4-BE49-F238E27FC236}">
+                <a16:creationId xmlns:a16="http://schemas.microsoft.com/office/drawing/2014/main" id="{DC7782F2-3B26-49EA-8B45-9A2DAB2AF745}"/>
+              </a:ext>
+            </a:extLst>
+          </p:cNvPr>
+          <p:cNvPicPr>
+            <a:picLocks noChangeAspect="1"/>
+          </p:cNvPicPr>
+          <p:nvPr/>
+        </p:nvPicPr>
+        <p:blipFill>
+          <a:blip r:embed="rId4"/>
+          <a:stretch>
+            <a:fillRect/>
+          </a:stretch>
+        </p:blipFill>
+        <p:spPr>
+          <a:xfrm>
+            <a:off x="4886676" y="1230401"/>
+            <a:ext cx="6184580" cy="4391052"/>
+          </a:xfrm>
+          <a:prstGeom prst="rect">
+            <a:avLst/>
+          </a:prstGeom>
+        </p:spPr>
+      </p:pic>
+    </p:spTree>
+    <p:extLst>
+      <p:ext uri="{BB962C8B-B14F-4D97-AF65-F5344CB8AC3E}">
+        <p14:creationId xmlns:p14="http://schemas.microsoft.com/office/powerpoint/2010/main" val="1129659576"/>
+      </p:ext>
+    </p:extLst>
+  </p:cSld>
+  <p:clrMapOvr>
+    <a:masterClrMapping/>
+  </p:clrMapOvr>
+</p:sld>
+</file>
+
+<file path=ppt/slides/slide7.xml><?xml version="1.0" encoding="utf-8"?>
+<p:sld xmlns:a="http://schemas.openxmlformats.org/drawingml/2006/main" xmlns:r="http://schemas.openxmlformats.org/officeDocument/2006/relationships" xmlns:p="http://schemas.openxmlformats.org/presentationml/2006/main">
+  <p:cSld>
+    <p:spTree>
+      <p:nvGrpSpPr>
+        <p:cNvPr id="1" name=""/>
+        <p:cNvGrpSpPr/>
+        <p:nvPr/>
+      </p:nvGrpSpPr>
+      <p:grpSpPr>
+        <a:xfrm>
+          <a:off x="0" y="0"/>
+          <a:ext cx="0" cy="0"/>
+          <a:chOff x="0" y="0"/>
+          <a:chExt cx="0" cy="0"/>
+        </a:xfrm>
+      </p:grpSpPr>
+      <p:sp>
+        <p:nvSpPr>
+          <p:cNvPr id="2" name="Titel 1">
+            <a:extLst>
+              <a:ext uri="{FF2B5EF4-FFF2-40B4-BE49-F238E27FC236}">
+                <a16:creationId xmlns:a16="http://schemas.microsoft.com/office/drawing/2014/main" id="{BB7621B1-4879-495C-AF42-B24479E09057}"/>
+              </a:ext>
+            </a:extLst>
+          </p:cNvPr>
+          <p:cNvSpPr>
+            <a:spLocks noGrp="1"/>
+          </p:cNvSpPr>
+          <p:nvPr>
+            <p:ph type="title"/>
+          </p:nvPr>
+        </p:nvSpPr>
+        <p:spPr/>
+        <p:txBody>
+          <a:bodyPr/>
+          <a:lstStyle/>
+          <a:p>
+            <a:r>
+              <a:rPr lang="en-US" cap="none" dirty="0"/>
+              <a:t>Wat </a:t>
+            </a:r>
+            <a:r>
+              <a:rPr lang="en-US" cap="none" dirty="0" err="1"/>
+              <a:t>gaan</a:t>
+            </a:r>
+            <a:r>
+              <a:rPr lang="en-US" cap="none" dirty="0"/>
+              <a:t> we de </a:t>
+            </a:r>
+            <a:r>
+              <a:rPr lang="en-US" cap="none" dirty="0" err="1"/>
+              <a:t>komende</a:t>
+            </a:r>
+            <a:r>
+              <a:rPr lang="en-US" cap="none" dirty="0"/>
+              <a:t> </a:t>
+            </a:r>
+            <a:r>
+              <a:rPr lang="en-US" cap="none" dirty="0" err="1"/>
+              <a:t>iteratie</a:t>
+            </a:r>
+            <a:r>
+              <a:rPr lang="en-US" cap="none" dirty="0"/>
+              <a:t> </a:t>
+            </a:r>
+            <a:r>
+              <a:rPr lang="en-US" cap="none" dirty="0" err="1"/>
+              <a:t>doen</a:t>
+            </a:r>
+            <a:r>
+              <a:rPr lang="en-US" cap="none" dirty="0"/>
+              <a:t>?</a:t>
+            </a:r>
+            <a:endParaRPr lang="nl-NL" cap="none" dirty="0"/>
+          </a:p>
+        </p:txBody>
+      </p:sp>
+      <p:sp>
+        <p:nvSpPr>
+          <p:cNvPr id="3" name="Tijdelijke aanduiding voor inhoud 2">
+            <a:extLst>
+              <a:ext uri="{FF2B5EF4-FFF2-40B4-BE49-F238E27FC236}">
+                <a16:creationId xmlns:a16="http://schemas.microsoft.com/office/drawing/2014/main" id="{6953CE3A-9FAD-4F46-A8EF-80BD18693715}"/>
+              </a:ext>
+            </a:extLst>
+          </p:cNvPr>
+          <p:cNvSpPr>
+            <a:spLocks noGrp="1"/>
+          </p:cNvSpPr>
+          <p:nvPr>
+            <p:ph idx="1"/>
+          </p:nvPr>
+        </p:nvSpPr>
+        <p:spPr/>
+        <p:txBody>
+          <a:bodyPr/>
+          <a:lstStyle/>
+          <a:p>
+            <a:r>
+              <a:rPr lang="en-US" dirty="0" err="1"/>
+              <a:t>Vooral</a:t>
+            </a:r>
+            <a:r>
+              <a:rPr lang="en-US" dirty="0"/>
+              <a:t> </a:t>
+            </a:r>
+            <a:r>
+              <a:rPr lang="en-US" dirty="0" err="1"/>
+              <a:t>richten</a:t>
+            </a:r>
+            <a:r>
+              <a:rPr lang="en-US" dirty="0"/>
+              <a:t> op </a:t>
+            </a:r>
+            <a:r>
+              <a:rPr lang="en-US" dirty="0" err="1"/>
+              <a:t>functionaliteit</a:t>
+            </a:r>
+            <a:r>
+              <a:rPr lang="en-US" dirty="0"/>
+              <a:t>.</a:t>
+            </a:r>
+            <a:endParaRPr lang="nl-NL" dirty="0"/>
+          </a:p>
+          <a:p>
+            <a:r>
+              <a:rPr lang="nl-NL" dirty="0"/>
+              <a:t>Van design naar code.</a:t>
+            </a:r>
+          </a:p>
+          <a:p>
+            <a:r>
+              <a:rPr lang="en-US" dirty="0"/>
+              <a:t>Database </a:t>
+            </a:r>
+            <a:r>
+              <a:rPr lang="en-US" dirty="0" err="1"/>
+              <a:t>opzetten</a:t>
+            </a:r>
+            <a:r>
+              <a:rPr lang="en-US" dirty="0"/>
+              <a:t>.</a:t>
+            </a:r>
+          </a:p>
+          <a:p>
+            <a:endParaRPr lang="en-US" dirty="0"/>
+          </a:p>
+        </p:txBody>
+      </p:sp>
+    </p:spTree>
+    <p:extLst>
+      <p:ext uri="{BB962C8B-B14F-4D97-AF65-F5344CB8AC3E}">
+        <p14:creationId xmlns:p14="http://schemas.microsoft.com/office/powerpoint/2010/main" val="2111781240"/>
+      </p:ext>
+    </p:extLst>
+  </p:cSld>
+  <p:clrMapOvr>
+    <a:masterClrMapping/>
+  </p:clrMapOvr>
+</p:sld>
+</file>
+
+<file path=ppt/slides/slide8.xml><?xml version="1.0" encoding="utf-8"?>
+<p:sld xmlns:a="http://schemas.openxmlformats.org/drawingml/2006/main" xmlns:r="http://schemas.openxmlformats.org/officeDocument/2006/relationships" xmlns:p="http://schemas.openxmlformats.org/presentationml/2006/main">
+  <p:cSld>
+    <p:spTree>
+      <p:nvGrpSpPr>
+        <p:cNvPr id="1" name=""/>
+        <p:cNvGrpSpPr/>
+        <p:nvPr/>
+      </p:nvGrpSpPr>
+      <p:grpSpPr>
+        <a:xfrm>
+          <a:off x="0" y="0"/>
+          <a:ext cx="0" cy="0"/>
+          <a:chOff x="0" y="0"/>
+          <a:chExt cx="0" cy="0"/>
+        </a:xfrm>
+      </p:grpSpPr>
+      <p:sp>
+        <p:nvSpPr>
+          <p:cNvPr id="2" name="Titel 1">
+            <a:extLst>
+              <a:ext uri="{FF2B5EF4-FFF2-40B4-BE49-F238E27FC236}">
+                <a16:creationId xmlns:a16="http://schemas.microsoft.com/office/drawing/2014/main" id="{F8952227-F425-49C9-90DD-F78AC1F10895}"/>
+              </a:ext>
+            </a:extLst>
+          </p:cNvPr>
+          <p:cNvSpPr>
+            <a:spLocks noGrp="1"/>
+          </p:cNvSpPr>
+          <p:nvPr>
+            <p:ph type="title"/>
+          </p:nvPr>
+        </p:nvSpPr>
+        <p:spPr/>
+        <p:txBody>
+          <a:bodyPr/>
+          <a:lstStyle/>
+          <a:p>
+            <a:r>
+              <a:rPr lang="en-US" cap="none" dirty="0" err="1"/>
+              <a:t>Vragen</a:t>
+            </a:r>
+            <a:r>
+              <a:rPr lang="en-US" cap="none" dirty="0"/>
+              <a:t> / </a:t>
+            </a:r>
+            <a:r>
+              <a:rPr lang="en-US" cap="none" dirty="0" err="1"/>
+              <a:t>opmerkingen</a:t>
+            </a:r>
+            <a:r>
+              <a:rPr lang="en-US" dirty="0"/>
+              <a:t>?</a:t>
+            </a:r>
+            <a:endParaRPr lang="nl-NL" dirty="0"/>
+          </a:p>
+        </p:txBody>
+      </p:sp>
+    </p:spTree>
+    <p:extLst>
+      <p:ext uri="{BB962C8B-B14F-4D97-AF65-F5344CB8AC3E}">
+        <p14:creationId xmlns:p14="http://schemas.microsoft.com/office/powerpoint/2010/main" val="809585369"/>
       </p:ext>
     </p:extLst>
   </p:cSld>

</xml_diff>